<commit_message>
update chapter 3 and 4
</commit_message>
<xml_diff>
--- a/Documents/chapter-2/images/pictures.pptx
+++ b/Documents/chapter-2/images/pictures.pptx
@@ -105,6 +105,11 @@
       </a:defRPr>
     </a:lvl9pPr>
   </p:defaultTextStyle>
+  <p:extLst>
+    <p:ext uri="{EFAFB233-063F-42B5-8137-9DF3F51BA10A}">
+      <p15:sldGuideLst xmlns:p15="http://schemas.microsoft.com/office/powerpoint/2012/main"/>
+    </p:ext>
+  </p:extLst>
 </p:presentation>
 </file>
 
@@ -239,7 +244,7 @@
           <a:p>
             <a:fld id="{13F7316A-1CA2-5742-BB9D-0DBB8DBDEEB3}" type="datetimeFigureOut">
               <a:rPr lang="en-GB" smtClean="0"/>
-              <a:t>29/09/2018</a:t>
+              <a:t>15/10/2018</a:t>
             </a:fld>
             <a:endParaRPr lang="en-GB"/>
           </a:p>
@@ -404,7 +409,7 @@
           <a:p>
             <a:fld id="{13F7316A-1CA2-5742-BB9D-0DBB8DBDEEB3}" type="datetimeFigureOut">
               <a:rPr lang="en-GB" smtClean="0"/>
-              <a:t>29/09/2018</a:t>
+              <a:t>15/10/2018</a:t>
             </a:fld>
             <a:endParaRPr lang="en-GB"/>
           </a:p>
@@ -579,7 +584,7 @@
           <a:p>
             <a:fld id="{13F7316A-1CA2-5742-BB9D-0DBB8DBDEEB3}" type="datetimeFigureOut">
               <a:rPr lang="en-GB" smtClean="0"/>
-              <a:t>29/09/2018</a:t>
+              <a:t>15/10/2018</a:t>
             </a:fld>
             <a:endParaRPr lang="en-GB"/>
           </a:p>
@@ -744,7 +749,7 @@
           <a:p>
             <a:fld id="{13F7316A-1CA2-5742-BB9D-0DBB8DBDEEB3}" type="datetimeFigureOut">
               <a:rPr lang="en-GB" smtClean="0"/>
-              <a:t>29/09/2018</a:t>
+              <a:t>15/10/2018</a:t>
             </a:fld>
             <a:endParaRPr lang="en-GB"/>
           </a:p>
@@ -985,7 +990,7 @@
           <a:p>
             <a:fld id="{13F7316A-1CA2-5742-BB9D-0DBB8DBDEEB3}" type="datetimeFigureOut">
               <a:rPr lang="en-GB" smtClean="0"/>
-              <a:t>29/09/2018</a:t>
+              <a:t>15/10/2018</a:t>
             </a:fld>
             <a:endParaRPr lang="en-GB"/>
           </a:p>
@@ -1212,7 +1217,7 @@
           <a:p>
             <a:fld id="{13F7316A-1CA2-5742-BB9D-0DBB8DBDEEB3}" type="datetimeFigureOut">
               <a:rPr lang="en-GB" smtClean="0"/>
-              <a:t>29/09/2018</a:t>
+              <a:t>15/10/2018</a:t>
             </a:fld>
             <a:endParaRPr lang="en-GB"/>
           </a:p>
@@ -1574,7 +1579,7 @@
           <a:p>
             <a:fld id="{13F7316A-1CA2-5742-BB9D-0DBB8DBDEEB3}" type="datetimeFigureOut">
               <a:rPr lang="en-GB" smtClean="0"/>
-              <a:t>29/09/2018</a:t>
+              <a:t>15/10/2018</a:t>
             </a:fld>
             <a:endParaRPr lang="en-GB"/>
           </a:p>
@@ -1687,7 +1692,7 @@
           <a:p>
             <a:fld id="{13F7316A-1CA2-5742-BB9D-0DBB8DBDEEB3}" type="datetimeFigureOut">
               <a:rPr lang="en-GB" smtClean="0"/>
-              <a:t>29/09/2018</a:t>
+              <a:t>15/10/2018</a:t>
             </a:fld>
             <a:endParaRPr lang="en-GB"/>
           </a:p>
@@ -1777,7 +1782,7 @@
           <a:p>
             <a:fld id="{13F7316A-1CA2-5742-BB9D-0DBB8DBDEEB3}" type="datetimeFigureOut">
               <a:rPr lang="en-GB" smtClean="0"/>
-              <a:t>29/09/2018</a:t>
+              <a:t>15/10/2018</a:t>
             </a:fld>
             <a:endParaRPr lang="en-GB"/>
           </a:p>
@@ -2049,7 +2054,7 @@
           <a:p>
             <a:fld id="{13F7316A-1CA2-5742-BB9D-0DBB8DBDEEB3}" type="datetimeFigureOut">
               <a:rPr lang="en-GB" smtClean="0"/>
-              <a:t>29/09/2018</a:t>
+              <a:t>15/10/2018</a:t>
             </a:fld>
             <a:endParaRPr lang="en-GB"/>
           </a:p>
@@ -2301,7 +2306,7 @@
           <a:p>
             <a:fld id="{13F7316A-1CA2-5742-BB9D-0DBB8DBDEEB3}" type="datetimeFigureOut">
               <a:rPr lang="en-GB" smtClean="0"/>
-              <a:t>29/09/2018</a:t>
+              <a:t>15/10/2018</a:t>
             </a:fld>
             <a:endParaRPr lang="en-GB"/>
           </a:p>
@@ -2509,7 +2514,7 @@
           <a:p>
             <a:fld id="{13F7316A-1CA2-5742-BB9D-0DBB8DBDEEB3}" type="datetimeFigureOut">
               <a:rPr lang="en-GB" smtClean="0"/>
-              <a:t>29/09/2018</a:t>
+              <a:t>15/10/2018</a:t>
             </a:fld>
             <a:endParaRPr lang="en-GB"/>
           </a:p>
@@ -2922,7 +2927,7 @@
         </p:nvSpPr>
         <p:spPr>
           <a:xfrm>
-            <a:off x="4391265" y="2249825"/>
+            <a:off x="3576256" y="2249825"/>
             <a:ext cx="1618937" cy="1648918"/>
           </a:xfrm>
           <a:prstGeom prst="cube">
@@ -2969,7 +2974,7 @@
         </p:nvSpPr>
         <p:spPr>
           <a:xfrm>
-            <a:off x="7281362" y="1013140"/>
+            <a:off x="6466353" y="1013140"/>
             <a:ext cx="344773" cy="4122288"/>
           </a:xfrm>
           <a:prstGeom prst="rect">
@@ -3014,7 +3019,7 @@
         </p:nvSpPr>
         <p:spPr>
           <a:xfrm>
-            <a:off x="8897297" y="1572643"/>
+            <a:off x="9828988" y="1607322"/>
             <a:ext cx="419725" cy="419725"/>
           </a:xfrm>
           <a:prstGeom prst="ellipse">
@@ -3059,7 +3064,7 @@
         </p:nvSpPr>
         <p:spPr>
           <a:xfrm>
-            <a:off x="8897297" y="2082309"/>
+            <a:off x="9828988" y="2116988"/>
             <a:ext cx="419725" cy="419725"/>
           </a:xfrm>
           <a:prstGeom prst="ellipse">
@@ -3104,7 +3109,7 @@
         </p:nvSpPr>
         <p:spPr>
           <a:xfrm>
-            <a:off x="8897296" y="2569487"/>
+            <a:off x="9828987" y="2604166"/>
             <a:ext cx="419725" cy="419725"/>
           </a:xfrm>
           <a:prstGeom prst="ellipse">
@@ -3149,7 +3154,7 @@
         </p:nvSpPr>
         <p:spPr>
           <a:xfrm>
-            <a:off x="8897295" y="3577571"/>
+            <a:off x="9828986" y="3612250"/>
             <a:ext cx="419725" cy="419725"/>
           </a:xfrm>
           <a:prstGeom prst="ellipse">
@@ -3194,7 +3199,7 @@
         </p:nvSpPr>
         <p:spPr>
           <a:xfrm>
-            <a:off x="8897295" y="3079153"/>
+            <a:off x="9828986" y="3113832"/>
             <a:ext cx="419725" cy="419725"/>
           </a:xfrm>
           <a:prstGeom prst="ellipse">
@@ -3239,7 +3244,7 @@
         </p:nvSpPr>
         <p:spPr>
           <a:xfrm>
-            <a:off x="8897295" y="4075989"/>
+            <a:off x="9828986" y="4110668"/>
             <a:ext cx="419725" cy="419725"/>
           </a:xfrm>
           <a:prstGeom prst="ellipse">
@@ -3284,7 +3289,7 @@
         </p:nvSpPr>
         <p:spPr>
           <a:xfrm>
-            <a:off x="11400656" y="2284673"/>
+            <a:off x="12332347" y="2319352"/>
             <a:ext cx="419725" cy="419725"/>
           </a:xfrm>
           <a:prstGeom prst="ellipse">
@@ -3329,7 +3334,7 @@
         </p:nvSpPr>
         <p:spPr>
           <a:xfrm>
-            <a:off x="11400660" y="2880530"/>
+            <a:off x="12332351" y="2915209"/>
             <a:ext cx="419725" cy="419725"/>
           </a:xfrm>
           <a:prstGeom prst="ellipse">
@@ -3374,7 +3379,7 @@
         </p:nvSpPr>
         <p:spPr>
           <a:xfrm>
-            <a:off x="11400659" y="3367708"/>
+            <a:off x="12332347" y="3537950"/>
             <a:ext cx="419725" cy="419725"/>
           </a:xfrm>
           <a:prstGeom prst="ellipse">
@@ -3419,7 +3424,7 @@
         </p:nvSpPr>
         <p:spPr>
           <a:xfrm rot="5400000">
-            <a:off x="8975998" y="2265931"/>
+            <a:off x="9907689" y="2300610"/>
             <a:ext cx="2735695" cy="1723871"/>
           </a:xfrm>
           <a:prstGeom prst="trapezoid">
@@ -3483,7 +3488,7 @@
         </p:blipFill>
         <p:spPr>
           <a:xfrm>
-            <a:off x="1447465" y="2498278"/>
+            <a:off x="632456" y="2498278"/>
             <a:ext cx="1429322" cy="1429322"/>
           </a:xfrm>
           <a:prstGeom prst="rect">
@@ -3499,7 +3504,7 @@
         </p:nvSpPr>
         <p:spPr>
           <a:xfrm>
-            <a:off x="1674133" y="4161061"/>
+            <a:off x="859124" y="4161061"/>
             <a:ext cx="797013" cy="369332"/>
           </a:xfrm>
           <a:prstGeom prst="rect">
@@ -3528,7 +3533,7 @@
         </p:nvCxnSpPr>
         <p:spPr>
           <a:xfrm>
-            <a:off x="3004812" y="3212938"/>
+            <a:off x="2189803" y="3212938"/>
             <a:ext cx="1084354" cy="0"/>
           </a:xfrm>
           <a:prstGeom prst="straightConnector1">
@@ -3561,7 +3566,7 @@
         </p:nvSpPr>
         <p:spPr>
           <a:xfrm>
-            <a:off x="2890752" y="3401031"/>
+            <a:off x="2075743" y="3401031"/>
             <a:ext cx="1335622" cy="400110"/>
           </a:xfrm>
           <a:prstGeom prst="rect">
@@ -3596,7 +3601,7 @@
         </p:nvSpPr>
         <p:spPr>
           <a:xfrm>
-            <a:off x="4139139" y="3477977"/>
+            <a:off x="3324130" y="3477977"/>
             <a:ext cx="302098" cy="246221"/>
           </a:xfrm>
           <a:prstGeom prst="rect">
@@ -3625,7 +3630,7 @@
         </p:nvSpPr>
         <p:spPr>
           <a:xfrm>
-            <a:off x="4445488" y="3915625"/>
+            <a:off x="3630479" y="3915625"/>
             <a:ext cx="302098" cy="246221"/>
           </a:xfrm>
           <a:prstGeom prst="rect">
@@ -3654,7 +3659,7 @@
         </p:nvSpPr>
         <p:spPr>
           <a:xfrm>
-            <a:off x="5467177" y="3212939"/>
+            <a:off x="4652168" y="3212939"/>
             <a:ext cx="831816" cy="246221"/>
           </a:xfrm>
           <a:prstGeom prst="rect">
@@ -3683,7 +3688,7 @@
         </p:nvCxnSpPr>
         <p:spPr>
           <a:xfrm>
-            <a:off x="6010201" y="3236886"/>
+            <a:off x="5195192" y="3236886"/>
             <a:ext cx="1084354" cy="0"/>
           </a:xfrm>
           <a:prstGeom prst="straightConnector1">
@@ -3716,7 +3721,7 @@
         </p:nvSpPr>
         <p:spPr>
           <a:xfrm>
-            <a:off x="6210492" y="3309620"/>
+            <a:off x="5395483" y="3309620"/>
             <a:ext cx="554960" cy="246221"/>
           </a:xfrm>
           <a:prstGeom prst="rect">
@@ -3745,7 +3750,7 @@
         </p:nvSpPr>
         <p:spPr>
           <a:xfrm>
-            <a:off x="7640743" y="3127867"/>
+            <a:off x="6825734" y="3127867"/>
             <a:ext cx="453970" cy="246221"/>
           </a:xfrm>
           <a:prstGeom prst="rect">
@@ -3774,7 +3779,7 @@
         </p:nvSpPr>
         <p:spPr>
           <a:xfrm>
-            <a:off x="8413211" y="3127867"/>
+            <a:off x="9344902" y="3162546"/>
             <a:ext cx="386644" cy="246221"/>
           </a:xfrm>
           <a:prstGeom prst="rect">
@@ -3803,7 +3808,7 @@
         </p:nvSpPr>
         <p:spPr>
           <a:xfrm>
-            <a:off x="7281361" y="5845630"/>
+            <a:off x="6466352" y="5845630"/>
             <a:ext cx="1518494" cy="375557"/>
           </a:xfrm>
           <a:prstGeom prst="leftArrow">
@@ -3854,7 +3859,7 @@
         </p:nvSpPr>
         <p:spPr>
           <a:xfrm rot="10800000">
-            <a:off x="10301886" y="5853794"/>
+            <a:off x="9486877" y="5853794"/>
             <a:ext cx="1518494" cy="375557"/>
           </a:xfrm>
           <a:prstGeom prst="leftArrow">
@@ -3905,7 +3910,7 @@
         </p:nvSpPr>
         <p:spPr>
           <a:xfrm>
-            <a:off x="8799855" y="5913917"/>
+            <a:off x="7984846" y="5913917"/>
             <a:ext cx="1604927" cy="276999"/>
           </a:xfrm>
           <a:prstGeom prst="rect">
@@ -3928,6 +3933,146 @@
               <a:t>connected layers</a:t>
             </a:r>
             <a:endParaRPr lang="en-GB" sz="1200" dirty="0"/>
+          </a:p>
+        </p:txBody>
+      </p:sp>
+      <p:sp>
+        <p:nvSpPr>
+          <p:cNvPr id="28" name="梯形 27"/>
+          <p:cNvSpPr/>
+          <p:nvPr/>
+        </p:nvSpPr>
+        <p:spPr>
+          <a:xfrm rot="5400000">
+            <a:off x="6357605" y="2213068"/>
+            <a:ext cx="4122289" cy="1722434"/>
+          </a:xfrm>
+          <a:prstGeom prst="trapezoid">
+            <a:avLst>
+              <a:gd name="adj" fmla="val 37174"/>
+            </a:avLst>
+          </a:prstGeom>
+          <a:solidFill>
+            <a:schemeClr val="bg2"/>
+          </a:solidFill>
+        </p:spPr>
+        <p:style>
+          <a:lnRef idx="2">
+            <a:schemeClr val="accent1">
+              <a:shade val="50000"/>
+            </a:schemeClr>
+          </a:lnRef>
+          <a:fillRef idx="1">
+            <a:schemeClr val="accent1"/>
+          </a:fillRef>
+          <a:effectRef idx="0">
+            <a:schemeClr val="accent1"/>
+          </a:effectRef>
+          <a:fontRef idx="minor">
+            <a:schemeClr val="lt1"/>
+          </a:fontRef>
+        </p:style>
+        <p:txBody>
+          <a:bodyPr rot="0" spcFirstLastPara="0" vertOverflow="overflow" horzOverflow="overflow" vert="horz" wrap="square" lIns="91440" tIns="45720" rIns="91440" bIns="45720" numCol="1" spcCol="0" rtlCol="0" fromWordArt="0" anchor="ctr" anchorCtr="0" forceAA="0" compatLnSpc="1">
+            <a:prstTxWarp prst="textNoShape">
+              <a:avLst/>
+            </a:prstTxWarp>
+            <a:noAutofit/>
+          </a:bodyPr>
+          <a:lstStyle/>
+          <a:p>
+            <a:pPr algn="ctr"/>
+            <a:endParaRPr lang="en-GB"/>
+          </a:p>
+        </p:txBody>
+      </p:sp>
+      <p:sp>
+        <p:nvSpPr>
+          <p:cNvPr id="30" name="文本框 29"/>
+          <p:cNvSpPr txBox="1"/>
+          <p:nvPr/>
+        </p:nvSpPr>
+        <p:spPr>
+          <a:xfrm>
+            <a:off x="7944760" y="3138422"/>
+            <a:ext cx="984565" cy="246221"/>
+          </a:xfrm>
+          <a:prstGeom prst="rect">
+            <a:avLst/>
+          </a:prstGeom>
+          <a:noFill/>
+        </p:spPr>
+        <p:txBody>
+          <a:bodyPr wrap="none" rtlCol="0">
+            <a:spAutoFit/>
+          </a:bodyPr>
+          <a:lstStyle/>
+          <a:p>
+            <a:r>
+              <a:rPr lang="en-GB" sz="1000" smtClean="0"/>
+              <a:t>fully connected</a:t>
+            </a:r>
+            <a:endParaRPr lang="en-GB" sz="1000" dirty="0"/>
+          </a:p>
+        </p:txBody>
+      </p:sp>
+      <p:sp>
+        <p:nvSpPr>
+          <p:cNvPr id="33" name="文本框 32"/>
+          <p:cNvSpPr txBox="1"/>
+          <p:nvPr/>
+        </p:nvSpPr>
+        <p:spPr>
+          <a:xfrm>
+            <a:off x="10760659" y="3063399"/>
+            <a:ext cx="984565" cy="246221"/>
+          </a:xfrm>
+          <a:prstGeom prst="rect">
+            <a:avLst/>
+          </a:prstGeom>
+          <a:noFill/>
+        </p:spPr>
+        <p:txBody>
+          <a:bodyPr wrap="none" rtlCol="0">
+            <a:spAutoFit/>
+          </a:bodyPr>
+          <a:lstStyle/>
+          <a:p>
+            <a:r>
+              <a:rPr lang="en-GB" sz="1000" smtClean="0"/>
+              <a:t>fully connected</a:t>
+            </a:r>
+            <a:endParaRPr lang="en-GB" sz="1000" dirty="0"/>
+          </a:p>
+        </p:txBody>
+      </p:sp>
+      <p:sp>
+        <p:nvSpPr>
+          <p:cNvPr id="38" name="文本框 37"/>
+          <p:cNvSpPr txBox="1"/>
+          <p:nvPr/>
+        </p:nvSpPr>
+        <p:spPr>
+          <a:xfrm>
+            <a:off x="12929115" y="3030130"/>
+            <a:ext cx="1223412" cy="246221"/>
+          </a:xfrm>
+          <a:prstGeom prst="rect">
+            <a:avLst/>
+          </a:prstGeom>
+          <a:noFill/>
+        </p:spPr>
+        <p:txBody>
+          <a:bodyPr wrap="none" rtlCol="0">
+            <a:spAutoFit/>
+          </a:bodyPr>
+          <a:lstStyle/>
+          <a:p>
+            <a:r>
+              <a:rPr lang="en-GB" sz="1000" dirty="0" smtClean="0"/>
+              <a:t>3-class classification</a:t>
+            </a:r>
+            <a:endParaRPr lang="en-GB" sz="1000" dirty="0"/>
           </a:p>
         </p:txBody>
       </p:sp>

</xml_diff>